<commit_message>
adding data and slides
</commit_message>
<xml_diff>
--- a/STT465_4.pptx
+++ b/STT465_4.pptx
@@ -3882,16 +3882,6 @@
               </a:rPr>
               <a:t>Monte Carlo Approximations</a:t>
             </a:r>
-            <a:r>
-              <a:rPr lang="en-US" sz="3200" dirty="0" smtClean="0">
-                <a:solidFill>
-                  <a:schemeClr val="accent2">
-                    <a:lumMod val="75000"/>
-                  </a:schemeClr>
-                </a:solidFill>
-              </a:rPr>
-              <a:t/>
-            </a:r>
             <a:br>
               <a:rPr lang="en-US" sz="3200" dirty="0" smtClean="0">
                 <a:solidFill>
@@ -4230,17 +4220,7 @@
                   </a:schemeClr>
                 </a:solidFill>
               </a:rPr>
-              <a:t>In most cases the integrals are difficult or </a:t>
-            </a:r>
-            <a:r>
-              <a:rPr lang="en-US" dirty="0" smtClean="0">
-                <a:solidFill>
-                  <a:schemeClr val="accent1">
-                    <a:lumMod val="75000"/>
-                  </a:schemeClr>
-                </a:solidFill>
-              </a:rPr>
-              <a:t>even impossible to compute analytically.</a:t>
+              <a:t>In most cases the integrals are difficult or even impossible to compute analytically.</a:t>
             </a:r>
           </a:p>
           <a:p>
@@ -4281,13 +4261,6 @@
               </a:rPr>
               <a:t>we can use sample from a distribution to approximate integrals.</a:t>
             </a:r>
-            <a:endParaRPr lang="en-US" dirty="0" smtClean="0">
-              <a:solidFill>
-                <a:schemeClr val="accent1">
-                  <a:lumMod val="75000"/>
-                </a:schemeClr>
-              </a:solidFill>
-            </a:endParaRPr>
           </a:p>
           <a:p>
             <a:r>
@@ -4325,7 +4298,7 @@
           <a:graphicData uri="http://schemas.openxmlformats.org/presentationml/2006/ole">
             <mc:AlternateContent xmlns:mc="http://schemas.openxmlformats.org/markup-compatibility/2006">
               <mc:Choice xmlns:v="urn:schemas-microsoft-com:vml" Requires="v">
-                <p:oleObj spid="_x0000_s14342" name="Equation" r:id="rId4" imgW="2768600" imgH="279400" progId="Equation.3">
+                <p:oleObj spid="_x0000_s14349" name="Equation" r:id="rId4" imgW="2768600" imgH="279400" progId="Equation.3">
                   <p:embed/>
                 </p:oleObj>
               </mc:Choice>
@@ -4382,7 +4355,7 @@
           <a:graphicData uri="http://schemas.openxmlformats.org/presentationml/2006/ole">
             <mc:AlternateContent xmlns:mc="http://schemas.openxmlformats.org/markup-compatibility/2006">
               <mc:Choice xmlns:v="urn:schemas-microsoft-com:vml" Requires="v">
-                <p:oleObj spid="_x0000_s14343" name="Equation" r:id="rId6" imgW="1498600" imgH="279400" progId="Equation.3">
+                <p:oleObj spid="_x0000_s14350" name="Equation" r:id="rId6" imgW="1498600" imgH="279400" progId="Equation.3">
                   <p:embed/>
                 </p:oleObj>
               </mc:Choice>
@@ -4439,7 +4412,7 @@
           <a:graphicData uri="http://schemas.openxmlformats.org/presentationml/2006/ole">
             <mc:AlternateContent xmlns:mc="http://schemas.openxmlformats.org/markup-compatibility/2006">
               <mc:Choice xmlns:v="urn:schemas-microsoft-com:vml" Requires="v">
-                <p:oleObj spid="_x0000_s14344" name="Equation" r:id="rId8" imgW="1765300" imgH="368300" progId="Equation.3">
+                <p:oleObj spid="_x0000_s14351" name="Equation" r:id="rId8" imgW="1765300" imgH="368300" progId="Equation.3">
                   <p:embed/>
                 </p:oleObj>
               </mc:Choice>
@@ -5368,18 +5341,15 @@
                   </a:schemeClr>
                 </a:solidFill>
               </a:rPr>
-              <a:t>WLLN  </a:t>
-            </a:r>
-            <a:r>
-              <a:rPr lang="en-US" dirty="0" smtClean="0">
-                <a:solidFill>
-                  <a:schemeClr val="accent1">
-                    <a:lumMod val="75000"/>
-                  </a:schemeClr>
-                </a:solidFill>
-              </a:rPr>
-              <a:t> </a:t>
-            </a:r>
+              <a:t>Law of large numbers   </a:t>
+            </a:r>
+            <a:endParaRPr lang="en-US" dirty="0" smtClean="0">
+              <a:solidFill>
+                <a:schemeClr val="accent1">
+                  <a:lumMod val="75000"/>
+                </a:schemeClr>
+              </a:solidFill>
+            </a:endParaRPr>
           </a:p>
           <a:p>
             <a:endParaRPr lang="en-US" dirty="0">
@@ -5450,7 +5420,7 @@
           <a:graphicData uri="http://schemas.openxmlformats.org/presentationml/2006/ole">
             <mc:AlternateContent xmlns:mc="http://schemas.openxmlformats.org/markup-compatibility/2006">
               <mc:Choice xmlns:v="urn:schemas-microsoft-com:vml" Requires="v">
-                <p:oleObj spid="_x0000_s1029" name="Equation" r:id="rId4" imgW="1016000" imgH="317500" progId="Equation.3">
+                <p:oleObj spid="_x0000_s1036" name="Equation" r:id="rId4" imgW="1016000" imgH="317500" progId="Equation.3">
                   <p:embed/>
                 </p:oleObj>
               </mc:Choice>
@@ -5507,7 +5477,7 @@
           <a:graphicData uri="http://schemas.openxmlformats.org/presentationml/2006/ole">
             <mc:AlternateContent xmlns:mc="http://schemas.openxmlformats.org/markup-compatibility/2006">
               <mc:Choice xmlns:v="urn:schemas-microsoft-com:vml" Requires="v">
-                <p:oleObj spid="_x0000_s1030" name="Equation" r:id="rId6" imgW="1993900" imgH="279400" progId="Equation.3">
+                <p:oleObj spid="_x0000_s1037" name="Equation" r:id="rId6" imgW="1993900" imgH="279400" progId="Equation.3">
                   <p:embed/>
                 </p:oleObj>
               </mc:Choice>
@@ -5551,20 +5521,20 @@
           <p:nvPr>
             <p:extLst>
               <p:ext uri="{D42A27DB-BD31-4B8C-83A1-F6EECF244321}">
-                <p14:modId xmlns:p14="http://schemas.microsoft.com/office/powerpoint/2010/main" val="1995933475"/>
+                <p14:modId xmlns:p14="http://schemas.microsoft.com/office/powerpoint/2010/main" val="4034357241"/>
               </p:ext>
             </p:extLst>
           </p:nvPr>
         </p:nvGraphicFramePr>
         <p:xfrm>
-          <a:off x="1828800" y="4495800"/>
+          <a:off x="2514600" y="5029200"/>
           <a:ext cx="2289175" cy="595313"/>
         </p:xfrm>
         <a:graphic>
           <a:graphicData uri="http://schemas.openxmlformats.org/presentationml/2006/ole">
             <mc:AlternateContent xmlns:mc="http://schemas.openxmlformats.org/markup-compatibility/2006">
               <mc:Choice xmlns:v="urn:schemas-microsoft-com:vml" Requires="v">
-                <p:oleObj spid="_x0000_s1031" name="Equation" r:id="rId8" imgW="1511300" imgH="393700" progId="Equation.3">
+                <p:oleObj spid="_x0000_s1038" name="Equation" r:id="rId8" imgW="1511300" imgH="393700" progId="Equation.3">
                   <p:embed/>
                 </p:oleObj>
               </mc:Choice>
@@ -5585,7 +5555,7 @@
                     </p:blipFill>
                     <p:spPr>
                       <a:xfrm>
-                        <a:off x="1828800" y="4495800"/>
+                        <a:off x="2514600" y="5029200"/>
                         <a:ext cx="2289175" cy="595313"/>
                       </a:xfrm>
                       <a:prstGeom prst="rect">

</xml_diff>